<commit_message>
Created mb and bg isotropy averages for initial, main, and recovery phase
</commit_message>
<xml_diff>
--- a/sampexlib/Concept Summaries/AE-Dst_vs_MB-Occ (1).pptx
+++ b/sampexlib/Concept Summaries/AE-Dst_vs_MB-Occ (1).pptx
@@ -269,7 +269,7 @@
           <a:p>
             <a:fld id="{3BA0B40D-B85F-4BA4-AEEB-86475D0EA605}" type="datetimeFigureOut">
               <a:rPr lang="en-US" smtClean="0"/>
-              <a:t>4/23/2021</a:t>
+              <a:t>11/8/2021</a:t>
             </a:fld>
             <a:endParaRPr lang="en-US"/>
           </a:p>
@@ -467,7 +467,7 @@
           <a:p>
             <a:fld id="{3BA0B40D-B85F-4BA4-AEEB-86475D0EA605}" type="datetimeFigureOut">
               <a:rPr lang="en-US" smtClean="0"/>
-              <a:t>4/23/2021</a:t>
+              <a:t>11/8/2021</a:t>
             </a:fld>
             <a:endParaRPr lang="en-US"/>
           </a:p>
@@ -675,7 +675,7 @@
           <a:p>
             <a:fld id="{3BA0B40D-B85F-4BA4-AEEB-86475D0EA605}" type="datetimeFigureOut">
               <a:rPr lang="en-US" smtClean="0"/>
-              <a:t>4/23/2021</a:t>
+              <a:t>11/8/2021</a:t>
             </a:fld>
             <a:endParaRPr lang="en-US"/>
           </a:p>
@@ -873,7 +873,7 @@
           <a:p>
             <a:fld id="{3BA0B40D-B85F-4BA4-AEEB-86475D0EA605}" type="datetimeFigureOut">
               <a:rPr lang="en-US" smtClean="0"/>
-              <a:t>4/23/2021</a:t>
+              <a:t>11/8/2021</a:t>
             </a:fld>
             <a:endParaRPr lang="en-US"/>
           </a:p>
@@ -1148,7 +1148,7 @@
           <a:p>
             <a:fld id="{3BA0B40D-B85F-4BA4-AEEB-86475D0EA605}" type="datetimeFigureOut">
               <a:rPr lang="en-US" smtClean="0"/>
-              <a:t>4/23/2021</a:t>
+              <a:t>11/8/2021</a:t>
             </a:fld>
             <a:endParaRPr lang="en-US"/>
           </a:p>
@@ -1413,7 +1413,7 @@
           <a:p>
             <a:fld id="{3BA0B40D-B85F-4BA4-AEEB-86475D0EA605}" type="datetimeFigureOut">
               <a:rPr lang="en-US" smtClean="0"/>
-              <a:t>4/23/2021</a:t>
+              <a:t>11/8/2021</a:t>
             </a:fld>
             <a:endParaRPr lang="en-US"/>
           </a:p>
@@ -1825,7 +1825,7 @@
           <a:p>
             <a:fld id="{3BA0B40D-B85F-4BA4-AEEB-86475D0EA605}" type="datetimeFigureOut">
               <a:rPr lang="en-US" smtClean="0"/>
-              <a:t>4/23/2021</a:t>
+              <a:t>11/8/2021</a:t>
             </a:fld>
             <a:endParaRPr lang="en-US"/>
           </a:p>
@@ -1966,7 +1966,7 @@
           <a:p>
             <a:fld id="{3BA0B40D-B85F-4BA4-AEEB-86475D0EA605}" type="datetimeFigureOut">
               <a:rPr lang="en-US" smtClean="0"/>
-              <a:t>4/23/2021</a:t>
+              <a:t>11/8/2021</a:t>
             </a:fld>
             <a:endParaRPr lang="en-US"/>
           </a:p>
@@ -2079,7 +2079,7 @@
           <a:p>
             <a:fld id="{3BA0B40D-B85F-4BA4-AEEB-86475D0EA605}" type="datetimeFigureOut">
               <a:rPr lang="en-US" smtClean="0"/>
-              <a:t>4/23/2021</a:t>
+              <a:t>11/8/2021</a:t>
             </a:fld>
             <a:endParaRPr lang="en-US"/>
           </a:p>
@@ -2390,7 +2390,7 @@
           <a:p>
             <a:fld id="{3BA0B40D-B85F-4BA4-AEEB-86475D0EA605}" type="datetimeFigureOut">
               <a:rPr lang="en-US" smtClean="0"/>
-              <a:t>4/23/2021</a:t>
+              <a:t>11/8/2021</a:t>
             </a:fld>
             <a:endParaRPr lang="en-US"/>
           </a:p>
@@ -2678,7 +2678,7 @@
           <a:p>
             <a:fld id="{3BA0B40D-B85F-4BA4-AEEB-86475D0EA605}" type="datetimeFigureOut">
               <a:rPr lang="en-US" smtClean="0"/>
-              <a:t>4/23/2021</a:t>
+              <a:t>11/8/2021</a:t>
             </a:fld>
             <a:endParaRPr lang="en-US"/>
           </a:p>
@@ -2919,7 +2919,7 @@
           <a:p>
             <a:fld id="{3BA0B40D-B85F-4BA4-AEEB-86475D0EA605}" type="datetimeFigureOut">
               <a:rPr lang="en-US" smtClean="0"/>
-              <a:t>4/23/2021</a:t>
+              <a:t>11/8/2021</a:t>
             </a:fld>
             <a:endParaRPr lang="en-US"/>
           </a:p>

</xml_diff>

<commit_message>
Updated code and AGU powerpoint presentation
</commit_message>
<xml_diff>
--- a/sampexlib/Concept Summaries/AE-Dst_vs_MB-Occ (1).pptx
+++ b/sampexlib/Concept Summaries/AE-Dst_vs_MB-Occ (1).pptx
@@ -269,7 +269,7 @@
           <a:p>
             <a:fld id="{3BA0B40D-B85F-4BA4-AEEB-86475D0EA605}" type="datetimeFigureOut">
               <a:rPr lang="en-US" smtClean="0"/>
-              <a:t>11/8/2021</a:t>
+              <a:t>12/1/2021</a:t>
             </a:fld>
             <a:endParaRPr lang="en-US"/>
           </a:p>
@@ -467,7 +467,7 @@
           <a:p>
             <a:fld id="{3BA0B40D-B85F-4BA4-AEEB-86475D0EA605}" type="datetimeFigureOut">
               <a:rPr lang="en-US" smtClean="0"/>
-              <a:t>11/8/2021</a:t>
+              <a:t>12/1/2021</a:t>
             </a:fld>
             <a:endParaRPr lang="en-US"/>
           </a:p>
@@ -675,7 +675,7 @@
           <a:p>
             <a:fld id="{3BA0B40D-B85F-4BA4-AEEB-86475D0EA605}" type="datetimeFigureOut">
               <a:rPr lang="en-US" smtClean="0"/>
-              <a:t>11/8/2021</a:t>
+              <a:t>12/1/2021</a:t>
             </a:fld>
             <a:endParaRPr lang="en-US"/>
           </a:p>
@@ -873,7 +873,7 @@
           <a:p>
             <a:fld id="{3BA0B40D-B85F-4BA4-AEEB-86475D0EA605}" type="datetimeFigureOut">
               <a:rPr lang="en-US" smtClean="0"/>
-              <a:t>11/8/2021</a:t>
+              <a:t>12/1/2021</a:t>
             </a:fld>
             <a:endParaRPr lang="en-US"/>
           </a:p>
@@ -1148,7 +1148,7 @@
           <a:p>
             <a:fld id="{3BA0B40D-B85F-4BA4-AEEB-86475D0EA605}" type="datetimeFigureOut">
               <a:rPr lang="en-US" smtClean="0"/>
-              <a:t>11/8/2021</a:t>
+              <a:t>12/1/2021</a:t>
             </a:fld>
             <a:endParaRPr lang="en-US"/>
           </a:p>
@@ -1413,7 +1413,7 @@
           <a:p>
             <a:fld id="{3BA0B40D-B85F-4BA4-AEEB-86475D0EA605}" type="datetimeFigureOut">
               <a:rPr lang="en-US" smtClean="0"/>
-              <a:t>11/8/2021</a:t>
+              <a:t>12/1/2021</a:t>
             </a:fld>
             <a:endParaRPr lang="en-US"/>
           </a:p>
@@ -1825,7 +1825,7 @@
           <a:p>
             <a:fld id="{3BA0B40D-B85F-4BA4-AEEB-86475D0EA605}" type="datetimeFigureOut">
               <a:rPr lang="en-US" smtClean="0"/>
-              <a:t>11/8/2021</a:t>
+              <a:t>12/1/2021</a:t>
             </a:fld>
             <a:endParaRPr lang="en-US"/>
           </a:p>
@@ -1966,7 +1966,7 @@
           <a:p>
             <a:fld id="{3BA0B40D-B85F-4BA4-AEEB-86475D0EA605}" type="datetimeFigureOut">
               <a:rPr lang="en-US" smtClean="0"/>
-              <a:t>11/8/2021</a:t>
+              <a:t>12/1/2021</a:t>
             </a:fld>
             <a:endParaRPr lang="en-US"/>
           </a:p>
@@ -2079,7 +2079,7 @@
           <a:p>
             <a:fld id="{3BA0B40D-B85F-4BA4-AEEB-86475D0EA605}" type="datetimeFigureOut">
               <a:rPr lang="en-US" smtClean="0"/>
-              <a:t>11/8/2021</a:t>
+              <a:t>12/1/2021</a:t>
             </a:fld>
             <a:endParaRPr lang="en-US"/>
           </a:p>
@@ -2390,7 +2390,7 @@
           <a:p>
             <a:fld id="{3BA0B40D-B85F-4BA4-AEEB-86475D0EA605}" type="datetimeFigureOut">
               <a:rPr lang="en-US" smtClean="0"/>
-              <a:t>11/8/2021</a:t>
+              <a:t>12/1/2021</a:t>
             </a:fld>
             <a:endParaRPr lang="en-US"/>
           </a:p>
@@ -2678,7 +2678,7 @@
           <a:p>
             <a:fld id="{3BA0B40D-B85F-4BA4-AEEB-86475D0EA605}" type="datetimeFigureOut">
               <a:rPr lang="en-US" smtClean="0"/>
-              <a:t>11/8/2021</a:t>
+              <a:t>12/1/2021</a:t>
             </a:fld>
             <a:endParaRPr lang="en-US"/>
           </a:p>
@@ -2919,7 +2919,7 @@
           <a:p>
             <a:fld id="{3BA0B40D-B85F-4BA4-AEEB-86475D0EA605}" type="datetimeFigureOut">
               <a:rPr lang="en-US" smtClean="0"/>
-              <a:t>11/8/2021</a:t>
+              <a:t>12/1/2021</a:t>
             </a:fld>
             <a:endParaRPr lang="en-US"/>
           </a:p>

</xml_diff>